<commit_message>
End of lessons, restarting MEPD v5
</commit_message>
<xml_diff>
--- a/Leçons/diapo/LP24.pptx
+++ b/Leçons/diapo/LP24.pptx
@@ -248,7 +248,7 @@
           <a:p>
             <a:fld id="{C262451B-073C-4FAC-8D0B-6648421A7945}" type="datetimeFigureOut">
               <a:rPr lang="fr-FR" smtClean="0"/>
-              <a:t>22/04/2020</a:t>
+              <a:t>19/05/2020</a:t>
             </a:fld>
             <a:endParaRPr lang="fr-FR"/>
           </a:p>
@@ -418,7 +418,7 @@
           <a:p>
             <a:fld id="{C262451B-073C-4FAC-8D0B-6648421A7945}" type="datetimeFigureOut">
               <a:rPr lang="fr-FR" smtClean="0"/>
-              <a:t>22/04/2020</a:t>
+              <a:t>19/05/2020</a:t>
             </a:fld>
             <a:endParaRPr lang="fr-FR"/>
           </a:p>
@@ -598,7 +598,7 @@
           <a:p>
             <a:fld id="{C262451B-073C-4FAC-8D0B-6648421A7945}" type="datetimeFigureOut">
               <a:rPr lang="fr-FR" smtClean="0"/>
-              <a:t>22/04/2020</a:t>
+              <a:t>19/05/2020</a:t>
             </a:fld>
             <a:endParaRPr lang="fr-FR"/>
           </a:p>
@@ -768,7 +768,7 @@
           <a:p>
             <a:fld id="{C262451B-073C-4FAC-8D0B-6648421A7945}" type="datetimeFigureOut">
               <a:rPr lang="fr-FR" smtClean="0"/>
-              <a:t>22/04/2020</a:t>
+              <a:t>19/05/2020</a:t>
             </a:fld>
             <a:endParaRPr lang="fr-FR"/>
           </a:p>
@@ -1014,7 +1014,7 @@
           <a:p>
             <a:fld id="{C262451B-073C-4FAC-8D0B-6648421A7945}" type="datetimeFigureOut">
               <a:rPr lang="fr-FR" smtClean="0"/>
-              <a:t>22/04/2020</a:t>
+              <a:t>19/05/2020</a:t>
             </a:fld>
             <a:endParaRPr lang="fr-FR"/>
           </a:p>
@@ -1246,7 +1246,7 @@
           <a:p>
             <a:fld id="{C262451B-073C-4FAC-8D0B-6648421A7945}" type="datetimeFigureOut">
               <a:rPr lang="fr-FR" smtClean="0"/>
-              <a:t>22/04/2020</a:t>
+              <a:t>19/05/2020</a:t>
             </a:fld>
             <a:endParaRPr lang="fr-FR"/>
           </a:p>
@@ -1613,7 +1613,7 @@
           <a:p>
             <a:fld id="{C262451B-073C-4FAC-8D0B-6648421A7945}" type="datetimeFigureOut">
               <a:rPr lang="fr-FR" smtClean="0"/>
-              <a:t>22/04/2020</a:t>
+              <a:t>19/05/2020</a:t>
             </a:fld>
             <a:endParaRPr lang="fr-FR"/>
           </a:p>
@@ -1731,7 +1731,7 @@
           <a:p>
             <a:fld id="{C262451B-073C-4FAC-8D0B-6648421A7945}" type="datetimeFigureOut">
               <a:rPr lang="fr-FR" smtClean="0"/>
-              <a:t>22/04/2020</a:t>
+              <a:t>19/05/2020</a:t>
             </a:fld>
             <a:endParaRPr lang="fr-FR"/>
           </a:p>
@@ -1826,7 +1826,7 @@
           <a:p>
             <a:fld id="{C262451B-073C-4FAC-8D0B-6648421A7945}" type="datetimeFigureOut">
               <a:rPr lang="fr-FR" smtClean="0"/>
-              <a:t>22/04/2020</a:t>
+              <a:t>19/05/2020</a:t>
             </a:fld>
             <a:endParaRPr lang="fr-FR"/>
           </a:p>
@@ -2103,7 +2103,7 @@
           <a:p>
             <a:fld id="{C262451B-073C-4FAC-8D0B-6648421A7945}" type="datetimeFigureOut">
               <a:rPr lang="fr-FR" smtClean="0"/>
-              <a:t>22/04/2020</a:t>
+              <a:t>19/05/2020</a:t>
             </a:fld>
             <a:endParaRPr lang="fr-FR"/>
           </a:p>
@@ -2356,7 +2356,7 @@
           <a:p>
             <a:fld id="{C262451B-073C-4FAC-8D0B-6648421A7945}" type="datetimeFigureOut">
               <a:rPr lang="fr-FR" smtClean="0"/>
-              <a:t>22/04/2020</a:t>
+              <a:t>19/05/2020</a:t>
             </a:fld>
             <a:endParaRPr lang="fr-FR"/>
           </a:p>
@@ -2569,7 +2569,7 @@
           <a:p>
             <a:fld id="{C262451B-073C-4FAC-8D0B-6648421A7945}" type="datetimeFigureOut">
               <a:rPr lang="fr-FR" smtClean="0"/>
-              <a:t>22/04/2020</a:t>
+              <a:t>19/05/2020</a:t>
             </a:fld>
             <a:endParaRPr lang="fr-FR"/>
           </a:p>
@@ -3103,7 +3103,7 @@
 </file>
 
 <file path=ppt/slides/slide2.xml><?xml version="1.0" encoding="utf-8"?>
-<p:sld xmlns:a="http://schemas.openxmlformats.org/drawingml/2006/main" xmlns:r="http://schemas.openxmlformats.org/officeDocument/2006/relationships" xmlns:p="http://schemas.openxmlformats.org/presentationml/2006/main">
+<p:sld xmlns:a="http://schemas.openxmlformats.org/drawingml/2006/main" xmlns:r="http://schemas.openxmlformats.org/officeDocument/2006/relationships" xmlns:p="http://schemas.openxmlformats.org/presentationml/2006/main" show="0">
   <p:cSld>
     <p:spTree>
       <p:nvGrpSpPr>
@@ -3383,6 +3383,14 @@
   <p:clrMapOvr>
     <a:masterClrMapping/>
   </p:clrMapOvr>
+  <mc:AlternateContent xmlns:mc="http://schemas.openxmlformats.org/markup-compatibility/2006">
+    <mc:Choice xmlns:p14="http://schemas.microsoft.com/office/powerpoint/2010/main" Requires="p14">
+      <p:transition spd="slow" p14:dur="2000"/>
+    </mc:Choice>
+    <mc:Fallback>
+      <p:transition spd="slow"/>
+    </mc:Fallback>
+  </mc:AlternateContent>
   <p:timing>
     <p:tnLst>
       <p:par>

</xml_diff>